<commit_message>
2025 3 11 PPT
</commit_message>
<xml_diff>
--- a/meeting/2025-02-10/2025-02-10 meeting 吳定洋.pptx
+++ b/meeting/2025-02-10/2025-02-10 meeting 吳定洋.pptx
@@ -1769,7 +1769,7 @@
           <a:p>
             <a:fld id="{FF3D1FE7-E52D-43D4-9F03-0B11FC6C31AA}" type="datetimeFigureOut">
               <a:rPr lang="zh-TW" altLang="en-US" smtClean="0"/>
-              <a:t>2025/2/9</a:t>
+              <a:t>2025/3/10</a:t>
             </a:fld>
             <a:endParaRPr lang="zh-TW" altLang="en-US"/>
           </a:p>
@@ -39126,7 +39126,7 @@
         <p:spPr>
           <a:xfrm>
             <a:off x="264160" y="1371839"/>
-            <a:ext cx="12110720" cy="4652427"/>
+            <a:ext cx="12110720" cy="3729098"/>
           </a:xfrm>
           <a:prstGeom prst="rect">
             <a:avLst/>
@@ -39158,20 +39158,6 @@
                 <a:ln>
                   <a:noFill/>
                 </a:ln>
-                <a:solidFill>
-                  <a:srgbClr val="FF0000"/>
-                </a:solidFill>
-                <a:effectLst/>
-                <a:latin typeface="微軟正黑體" panose="020B0604030504040204" pitchFamily="34" charset="-120"/>
-                <a:ea typeface="微軟正黑體" panose="020B0604030504040204" pitchFamily="34" charset="-120"/>
-              </a:rPr>
-              <a:t>DNN </a:t>
-            </a:r>
-            <a:r>
-              <a:rPr kumimoji="0" lang="en-US" altLang="zh-TW" sz="2000" b="1" i="0" u="none" strike="noStrike" cap="none" normalizeH="0" baseline="0" dirty="0">
-                <a:ln>
-                  <a:noFill/>
-                </a:ln>
                 <a:effectLst/>
                 <a:latin typeface="微軟正黑體" panose="020B0604030504040204" pitchFamily="34" charset="-120"/>
                 <a:ea typeface="微軟正黑體" panose="020B0604030504040204" pitchFamily="34" charset="-120"/>
@@ -39314,119 +39300,86 @@
               </a:spcAft>
             </a:pPr>
             <a:r>
-              <a:rPr kumimoji="0" lang="en-US" altLang="zh-TW" sz="2000" b="1" i="0" u="none" strike="noStrike" cap="none" normalizeH="0" baseline="0" dirty="0">
-                <a:ln>
-                  <a:noFill/>
-                </a:ln>
+              <a:rPr lang="en-US" altLang="zh-TW" sz="2000" b="1" dirty="0">
+                <a:latin typeface="微軟正黑體" panose="020B0604030504040204" pitchFamily="34" charset="-120"/>
+                <a:ea typeface="微軟正黑體" panose="020B0604030504040204" pitchFamily="34" charset="-120"/>
+              </a:rPr>
+              <a:t>1 </a:t>
+            </a:r>
+            <a:r>
+              <a:rPr lang="en-US" altLang="zh-TW" sz="2000" b="1" dirty="0" err="1">
+                <a:latin typeface="微軟正黑體" panose="020B0604030504040204" pitchFamily="34" charset="-120"/>
+                <a:ea typeface="微軟正黑體" panose="020B0604030504040204" pitchFamily="34" charset="-120"/>
+              </a:rPr>
+              <a:t>mcAP</a:t>
+            </a:r>
+            <a:r>
+              <a:rPr lang="en-US" altLang="zh-TW" sz="2000" b="1" dirty="0">
+                <a:latin typeface="微軟正黑體" panose="020B0604030504040204" pitchFamily="34" charset="-120"/>
+                <a:ea typeface="微軟正黑體" panose="020B0604030504040204" pitchFamily="34" charset="-120"/>
+              </a:rPr>
+              <a:t>(Best) Model</a:t>
+            </a:r>
+            <a:r>
+              <a:rPr lang="en-US" altLang="zh-TW" sz="2000" dirty="0">
+                <a:latin typeface="微軟正黑體" panose="020B0604030504040204" pitchFamily="34" charset="-120"/>
+                <a:ea typeface="微軟正黑體" panose="020B0604030504040204" pitchFamily="34" charset="-120"/>
+              </a:rPr>
+              <a:t>: </a:t>
+            </a:r>
+            <a:r>
+              <a:rPr lang="zh-TW" altLang="en-US" sz="2000" dirty="0">
+                <a:latin typeface="微軟正黑體" panose="020B0604030504040204" pitchFamily="34" charset="-120"/>
+                <a:ea typeface="微軟正黑體" panose="020B0604030504040204" pitchFamily="34" charset="-120"/>
+              </a:rPr>
+              <a:t>僅更新 </a:t>
+            </a:r>
+            <a:r>
+              <a:rPr lang="en-US" altLang="zh-TW" sz="2000" dirty="0">
+                <a:latin typeface="微軟正黑體" panose="020B0604030504040204" pitchFamily="34" charset="-120"/>
+                <a:ea typeface="微軟正黑體" panose="020B0604030504040204" pitchFamily="34" charset="-120"/>
+              </a:rPr>
+              <a:t>1 </a:t>
+            </a:r>
+            <a:r>
+              <a:rPr lang="zh-TW" altLang="en-US" sz="2000" dirty="0">
+                <a:latin typeface="微軟正黑體" panose="020B0604030504040204" pitchFamily="34" charset="-120"/>
+                <a:ea typeface="微軟正黑體" panose="020B0604030504040204" pitchFamily="34" charset="-120"/>
+              </a:rPr>
+              <a:t>個 </a:t>
+            </a:r>
+            <a:r>
+              <a:rPr lang="en-US" altLang="zh-TW" sz="2000" dirty="0" err="1">
+                <a:latin typeface="微軟正黑體" panose="020B0604030504040204" pitchFamily="34" charset="-120"/>
+                <a:ea typeface="微軟正黑體" panose="020B0604030504040204" pitchFamily="34" charset="-120"/>
+              </a:rPr>
+              <a:t>mcAP</a:t>
+            </a:r>
+            <a:r>
+              <a:rPr lang="zh-TW" altLang="en-US" sz="2000" dirty="0">
+                <a:latin typeface="微軟正黑體" panose="020B0604030504040204" pitchFamily="34" charset="-120"/>
+                <a:ea typeface="微軟正黑體" panose="020B0604030504040204" pitchFamily="34" charset="-120"/>
+              </a:rPr>
+              <a:t>，且選擇影響最大者（</a:t>
+            </a:r>
+            <a:r>
+              <a:rPr lang="en-US" altLang="zh-TW" sz="2000" b="1" dirty="0">
                 <a:solidFill>
-                  <a:srgbClr val="FF0000"/>
+                  <a:schemeClr val="accent1">
+                    <a:lumMod val="50000"/>
+                  </a:schemeClr>
                 </a:solidFill>
-                <a:effectLst/>
-                <a:latin typeface="微軟正黑體" panose="020B0604030504040204" pitchFamily="34" charset="-120"/>
-                <a:ea typeface="微軟正黑體" panose="020B0604030504040204" pitchFamily="34" charset="-120"/>
-              </a:rPr>
-              <a:t>DNN </a:t>
-            </a:r>
-            <a:r>
-              <a:rPr lang="en-US" altLang="zh-TW" sz="2000" b="1" dirty="0">
-                <a:effectLst/>
-                <a:latin typeface="微軟正黑體" panose="020B0604030504040204" pitchFamily="34" charset="-120"/>
-                <a:ea typeface="微軟正黑體" panose="020B0604030504040204" pitchFamily="34" charset="-120"/>
-              </a:rPr>
-              <a:t>4 </a:t>
-            </a:r>
-            <a:r>
-              <a:rPr lang="en-US" altLang="zh-TW" sz="2000" b="1" dirty="0" err="1">
-                <a:effectLst/>
-                <a:latin typeface="微軟正黑體" panose="020B0604030504040204" pitchFamily="34" charset="-120"/>
-                <a:ea typeface="微軟正黑體" panose="020B0604030504040204" pitchFamily="34" charset="-120"/>
-              </a:rPr>
-              <a:t>mcAP</a:t>
-            </a:r>
-            <a:r>
-              <a:rPr lang="en-US" altLang="zh-TW" sz="2000" b="1" dirty="0">
-                <a:effectLst/>
-                <a:latin typeface="微軟正黑體" panose="020B0604030504040204" pitchFamily="34" charset="-120"/>
-                <a:ea typeface="微軟正黑體" panose="020B0604030504040204" pitchFamily="34" charset="-120"/>
-              </a:rPr>
-              <a:t> Model</a:t>
-            </a:r>
-            <a:r>
-              <a:rPr lang="en-US" altLang="zh-TW" sz="2000" dirty="0">
-                <a:latin typeface="微軟正黑體" panose="020B0604030504040204" pitchFamily="34" charset="-120"/>
-                <a:ea typeface="微軟正黑體" panose="020B0604030504040204" pitchFamily="34" charset="-120"/>
-              </a:rPr>
-              <a:t>: </a:t>
+                <a:latin typeface="微軟正黑體" panose="020B0604030504040204" pitchFamily="34" charset="-120"/>
+                <a:ea typeface="微軟正黑體" panose="020B0604030504040204" pitchFamily="34" charset="-120"/>
+              </a:rPr>
+              <a:t>AP1</a:t>
             </a:r>
             <a:r>
               <a:rPr lang="zh-TW" altLang="en-US" sz="2000" dirty="0">
                 <a:latin typeface="微軟正黑體" panose="020B0604030504040204" pitchFamily="34" charset="-120"/>
                 <a:ea typeface="微軟正黑體" panose="020B0604030504040204" pitchFamily="34" charset="-120"/>
               </a:rPr>
-              <a:t>所有 </a:t>
-            </a:r>
-            <a:r>
-              <a:rPr lang="en-US" altLang="zh-TW" sz="2000" dirty="0">
-                <a:latin typeface="微軟正黑體" panose="020B0604030504040204" pitchFamily="34" charset="-120"/>
-                <a:ea typeface="微軟正黑體" panose="020B0604030504040204" pitchFamily="34" charset="-120"/>
-              </a:rPr>
-              <a:t>AP </a:t>
-            </a:r>
-            <a:r>
-              <a:rPr lang="zh-TW" altLang="en-US" sz="2000" dirty="0">
-                <a:latin typeface="微軟正黑體" panose="020B0604030504040204" pitchFamily="34" charset="-120"/>
-                <a:ea typeface="微軟正黑體" panose="020B0604030504040204" pitchFamily="34" charset="-120"/>
-              </a:rPr>
-              <a:t>均更新為 </a:t>
-            </a:r>
-            <a:r>
-              <a:rPr lang="en-US" altLang="zh-TW" sz="2000" dirty="0" err="1">
-                <a:latin typeface="微軟正黑體" panose="020B0604030504040204" pitchFamily="34" charset="-120"/>
-                <a:ea typeface="微軟正黑體" panose="020B0604030504040204" pitchFamily="34" charset="-120"/>
-              </a:rPr>
-              <a:t>mcAP</a:t>
-            </a:r>
-            <a:r>
-              <a:rPr lang="zh-TW" altLang="en-US" sz="2000" dirty="0">
-                <a:latin typeface="微軟正黑體" panose="020B0604030504040204" pitchFamily="34" charset="-120"/>
-                <a:ea typeface="微軟正黑體" panose="020B0604030504040204" pitchFamily="34" charset="-120"/>
-              </a:rPr>
-              <a:t>，包含 </a:t>
-            </a:r>
-            <a:r>
-              <a:rPr lang="en-US" altLang="zh-TW" sz="2000" dirty="0">
-                <a:latin typeface="微軟正黑體" panose="020B0604030504040204" pitchFamily="34" charset="-120"/>
-                <a:ea typeface="微軟正黑體" panose="020B0604030504040204" pitchFamily="34" charset="-120"/>
-              </a:rPr>
-              <a:t>RSSI, distance </a:t>
-            </a:r>
-            <a:r>
-              <a:rPr lang="zh-TW" altLang="en-US" sz="2000" dirty="0">
-                <a:latin typeface="微軟正黑體" panose="020B0604030504040204" pitchFamily="34" charset="-120"/>
-                <a:ea typeface="微軟正黑體" panose="020B0604030504040204" pitchFamily="34" charset="-120"/>
-              </a:rPr>
-              <a:t>和 </a:t>
-            </a:r>
-            <a:r>
-              <a:rPr lang="en-US" altLang="zh-TW" sz="2000" dirty="0" err="1">
-                <a:latin typeface="微軟正黑體" panose="020B0604030504040204" pitchFamily="34" charset="-120"/>
-                <a:ea typeface="微軟正黑體" panose="020B0604030504040204" pitchFamily="34" charset="-120"/>
-              </a:rPr>
-              <a:t>StdDev</a:t>
-            </a:r>
-            <a:r>
-              <a:rPr lang="en-US" altLang="zh-TW" sz="2000" dirty="0">
-                <a:latin typeface="微軟正黑體" panose="020B0604030504040204" pitchFamily="34" charset="-120"/>
-                <a:ea typeface="微軟正黑體" panose="020B0604030504040204" pitchFamily="34" charset="-120"/>
-              </a:rPr>
-              <a:t> </a:t>
-            </a:r>
-            <a:r>
-              <a:rPr lang="zh-TW" altLang="en-US" sz="2000" dirty="0">
-                <a:latin typeface="微軟正黑體" panose="020B0604030504040204" pitchFamily="34" charset="-120"/>
-                <a:ea typeface="微軟正黑體" panose="020B0604030504040204" pitchFamily="34" charset="-120"/>
-              </a:rPr>
-              <a:t>資料</a:t>
+              <a:t>）</a:t>
             </a:r>
             <a:endParaRPr lang="en-US" altLang="zh-TW" sz="2000" dirty="0">
               <a:latin typeface="微軟正黑體" panose="020B0604030504040204" pitchFamily="34" charset="-120"/>
@@ -39452,57 +39405,7 @@
                 <a:latin typeface="微軟正黑體" panose="020B0604030504040204" pitchFamily="34" charset="-120"/>
                 <a:ea typeface="微軟正黑體" panose="020B0604030504040204" pitchFamily="34" charset="-120"/>
               </a:rPr>
-              <a:t>特徵：                                                                                                                                   </a:t>
-            </a:r>
-            <a:r>
-              <a:rPr lang="en-US" altLang="zh-TW" sz="1600" dirty="0">
-                <a:solidFill>
-                  <a:srgbClr val="FF0000"/>
-                </a:solidFill>
-                <a:latin typeface="微軟正黑體" panose="020B0604030504040204" pitchFamily="34" charset="-120"/>
-                <a:ea typeface="微軟正黑體" panose="020B0604030504040204" pitchFamily="34" charset="-120"/>
-              </a:rPr>
-              <a:t>+ 4 </a:t>
-            </a:r>
-            <a:r>
-              <a:rPr lang="zh-TW" altLang="en-US" sz="1600" dirty="0">
-                <a:solidFill>
-                  <a:srgbClr val="FF0000"/>
-                </a:solidFill>
-                <a:latin typeface="微軟正黑體" panose="020B0604030504040204" pitchFamily="34" charset="-120"/>
-                <a:ea typeface="微軟正黑體" panose="020B0604030504040204" pitchFamily="34" charset="-120"/>
-              </a:rPr>
-              <a:t>個</a:t>
-            </a:r>
-            <a:r>
-              <a:rPr lang="en-US" altLang="zh-TW" sz="1600" dirty="0">
-                <a:solidFill>
-                  <a:srgbClr val="FF0000"/>
-                </a:solidFill>
-                <a:latin typeface="微軟正黑體" panose="020B0604030504040204" pitchFamily="34" charset="-120"/>
-                <a:ea typeface="微軟正黑體" panose="020B0604030504040204" pitchFamily="34" charset="-120"/>
-              </a:rPr>
-              <a:t>AP</a:t>
-            </a:r>
-            <a:r>
-              <a:rPr lang="zh-TW" altLang="en-US" sz="1600" dirty="0">
-                <a:solidFill>
-                  <a:srgbClr val="FF0000"/>
-                </a:solidFill>
-                <a:latin typeface="微軟正黑體" panose="020B0604030504040204" pitchFamily="34" charset="-120"/>
-                <a:ea typeface="微軟正黑體" panose="020B0604030504040204" pitchFamily="34" charset="-120"/>
-              </a:rPr>
-              <a:t>的 </a:t>
-            </a:r>
-            <a:r>
-              <a:rPr lang="en-US" altLang="zh-TW" sz="1600" dirty="0" err="1">
-                <a:solidFill>
-                  <a:srgbClr val="FF0000"/>
-                </a:solidFill>
-                <a:latin typeface="微軟正黑體" panose="020B0604030504040204" pitchFamily="34" charset="-120"/>
-                <a:ea typeface="微軟正黑體" panose="020B0604030504040204" pitchFamily="34" charset="-120"/>
-              </a:rPr>
-              <a:t>StdDev</a:t>
+              <a:t>特徵：</a:t>
             </a:r>
             <a:endParaRPr lang="en-US" altLang="zh-TW" sz="1600" dirty="0">
               <a:solidFill>
@@ -39525,25 +39428,11 @@
               </a:spcAft>
             </a:pPr>
             <a:r>
-              <a:rPr kumimoji="0" lang="en-US" altLang="zh-TW" sz="2000" b="1" i="0" u="none" strike="noStrike" cap="none" normalizeH="0" baseline="0" dirty="0">
-                <a:ln>
-                  <a:noFill/>
-                </a:ln>
-                <a:solidFill>
-                  <a:srgbClr val="FF0000"/>
-                </a:solidFill>
-                <a:effectLst/>
-                <a:latin typeface="微軟正黑體" panose="020B0604030504040204" pitchFamily="34" charset="-120"/>
-                <a:ea typeface="微軟正黑體" panose="020B0604030504040204" pitchFamily="34" charset="-120"/>
-              </a:rPr>
-              <a:t>DNN </a:t>
-            </a:r>
-            <a:r>
               <a:rPr lang="en-US" altLang="zh-TW" sz="2000" b="1" dirty="0">
                 <a:latin typeface="微軟正黑體" panose="020B0604030504040204" pitchFamily="34" charset="-120"/>
                 <a:ea typeface="微軟正黑體" panose="020B0604030504040204" pitchFamily="34" charset="-120"/>
               </a:rPr>
-              <a:t>1 </a:t>
+              <a:t>2 </a:t>
             </a:r>
             <a:r>
               <a:rPr lang="en-US" altLang="zh-TW" sz="2000" b="1" dirty="0" err="1">
@@ -39578,7 +39467,7 @@
                 <a:latin typeface="微軟正黑體" panose="020B0604030504040204" pitchFamily="34" charset="-120"/>
                 <a:ea typeface="微軟正黑體" panose="020B0604030504040204" pitchFamily="34" charset="-120"/>
               </a:rPr>
-              <a:t>1 </a:t>
+              <a:t>2 </a:t>
             </a:r>
             <a:r>
               <a:rPr lang="zh-TW" altLang="en-US" sz="2000" dirty="0">
@@ -39599,7 +39488,28 @@
                 <a:latin typeface="微軟正黑體" panose="020B0604030504040204" pitchFamily="34" charset="-120"/>
                 <a:ea typeface="微軟正黑體" panose="020B0604030504040204" pitchFamily="34" charset="-120"/>
               </a:rPr>
-              <a:t>，且選擇影響最大者（</a:t>
+              <a:t>，選擇效果最佳的 </a:t>
+            </a:r>
+            <a:r>
+              <a:rPr lang="en-US" altLang="zh-TW" sz="2000" dirty="0">
+                <a:latin typeface="微軟正黑體" panose="020B0604030504040204" pitchFamily="34" charset="-120"/>
+                <a:ea typeface="微軟正黑體" panose="020B0604030504040204" pitchFamily="34" charset="-120"/>
+              </a:rPr>
+              <a:t>AP </a:t>
+            </a:r>
+            <a:r>
+              <a:rPr lang="zh-TW" altLang="en-US" sz="2000" dirty="0">
+                <a:latin typeface="微軟正黑體" panose="020B0604030504040204" pitchFamily="34" charset="-120"/>
+                <a:ea typeface="微軟正黑體" panose="020B0604030504040204" pitchFamily="34" charset="-120"/>
+              </a:rPr>
+              <a:t>更新組合 </a:t>
+            </a:r>
+            <a:r>
+              <a:rPr lang="en-US" altLang="zh-TW" sz="2000" dirty="0">
+                <a:latin typeface="微軟正黑體" panose="020B0604030504040204" pitchFamily="34" charset="-120"/>
+                <a:ea typeface="微軟正黑體" panose="020B0604030504040204" pitchFamily="34" charset="-120"/>
+              </a:rPr>
+              <a:t>( </a:t>
             </a:r>
             <a:r>
               <a:rPr lang="en-US" altLang="zh-TW" sz="2000" b="1" dirty="0">
@@ -39611,19 +39521,15 @@
                 <a:latin typeface="微軟正黑體" panose="020B0604030504040204" pitchFamily="34" charset="-120"/>
                 <a:ea typeface="微軟正黑體" panose="020B0604030504040204" pitchFamily="34" charset="-120"/>
               </a:rPr>
-              <a:t>AP1</a:t>
-            </a:r>
-            <a:r>
-              <a:rPr lang="zh-TW" altLang="en-US" sz="2000" dirty="0">
-                <a:latin typeface="微軟正黑體" panose="020B0604030504040204" pitchFamily="34" charset="-120"/>
-                <a:ea typeface="微軟正黑體" panose="020B0604030504040204" pitchFamily="34" charset="-120"/>
-              </a:rPr>
-              <a:t>）</a:t>
-            </a:r>
-            <a:endParaRPr lang="en-US" altLang="zh-TW" sz="2000" dirty="0">
-              <a:latin typeface="微軟正黑體" panose="020B0604030504040204" pitchFamily="34" charset="-120"/>
-              <a:ea typeface="微軟正黑體" panose="020B0604030504040204" pitchFamily="34" charset="-120"/>
-            </a:endParaRPr>
+              <a:t>AP1 &amp; AP3 </a:t>
+            </a:r>
+            <a:r>
+              <a:rPr lang="en-US" altLang="zh-TW" sz="2000" dirty="0">
+                <a:latin typeface="微軟正黑體" panose="020B0604030504040204" pitchFamily="34" charset="-120"/>
+                <a:ea typeface="微軟正黑體" panose="020B0604030504040204" pitchFamily="34" charset="-120"/>
+              </a:rPr>
+              <a:t>)</a:t>
+            </a:r>
           </a:p>
           <a:p>
             <a:pPr marL="800100" lvl="1" indent="-342900" eaLnBrk="0" fontAlgn="base" hangingPunct="0">
@@ -39644,226 +39550,7 @@
                 <a:latin typeface="微軟正黑體" panose="020B0604030504040204" pitchFamily="34" charset="-120"/>
                 <a:ea typeface="微軟正黑體" panose="020B0604030504040204" pitchFamily="34" charset="-120"/>
               </a:rPr>
-              <a:t>特徵：                                                                            </a:t>
-            </a:r>
-            <a:r>
-              <a:rPr lang="en-US" altLang="zh-TW" sz="1600" dirty="0">
-                <a:solidFill>
-                  <a:srgbClr val="FF0000"/>
-                </a:solidFill>
-                <a:latin typeface="微軟正黑體" panose="020B0604030504040204" pitchFamily="34" charset="-120"/>
-                <a:ea typeface="微軟正黑體" panose="020B0604030504040204" pitchFamily="34" charset="-120"/>
-              </a:rPr>
-              <a:t>+ AP1 </a:t>
-            </a:r>
-            <a:r>
-              <a:rPr lang="zh-TW" altLang="en-US" sz="1600" dirty="0">
-                <a:solidFill>
-                  <a:srgbClr val="FF0000"/>
-                </a:solidFill>
-                <a:latin typeface="微軟正黑體" panose="020B0604030504040204" pitchFamily="34" charset="-120"/>
-                <a:ea typeface="微軟正黑體" panose="020B0604030504040204" pitchFamily="34" charset="-120"/>
-              </a:rPr>
-              <a:t>的 </a:t>
-            </a:r>
-            <a:r>
-              <a:rPr lang="en-US" altLang="zh-TW" sz="1600" dirty="0" err="1">
-                <a:solidFill>
-                  <a:srgbClr val="FF0000"/>
-                </a:solidFill>
-                <a:latin typeface="微軟正黑體" panose="020B0604030504040204" pitchFamily="34" charset="-120"/>
-                <a:ea typeface="微軟正黑體" panose="020B0604030504040204" pitchFamily="34" charset="-120"/>
-              </a:rPr>
-              <a:t>StdDev</a:t>
-            </a:r>
-            <a:endParaRPr lang="en-US" altLang="zh-TW" sz="1600" dirty="0">
-              <a:solidFill>
-                <a:srgbClr val="FF0000"/>
-              </a:solidFill>
-              <a:latin typeface="微軟正黑體" panose="020B0604030504040204" pitchFamily="34" charset="-120"/>
-              <a:ea typeface="微軟正黑體" panose="020B0604030504040204" pitchFamily="34" charset="-120"/>
-            </a:endParaRPr>
-          </a:p>
-          <a:p>
-            <a:pPr eaLnBrk="0" fontAlgn="base" hangingPunct="0">
-              <a:lnSpc>
-                <a:spcPct val="150000"/>
-              </a:lnSpc>
-              <a:spcBef>
-                <a:spcPct val="0"/>
-              </a:spcBef>
-              <a:spcAft>
-                <a:spcPct val="0"/>
-              </a:spcAft>
-            </a:pPr>
-            <a:r>
-              <a:rPr kumimoji="0" lang="en-US" altLang="zh-TW" sz="2000" b="1" i="0" u="none" strike="noStrike" cap="none" normalizeH="0" baseline="0" dirty="0">
-                <a:ln>
-                  <a:noFill/>
-                </a:ln>
-                <a:solidFill>
-                  <a:srgbClr val="FF0000"/>
-                </a:solidFill>
-                <a:effectLst/>
-                <a:latin typeface="微軟正黑體" panose="020B0604030504040204" pitchFamily="34" charset="-120"/>
-                <a:ea typeface="微軟正黑體" panose="020B0604030504040204" pitchFamily="34" charset="-120"/>
-              </a:rPr>
-              <a:t>DNN </a:t>
-            </a:r>
-            <a:r>
-              <a:rPr lang="en-US" altLang="zh-TW" sz="2000" b="1" dirty="0">
-                <a:latin typeface="微軟正黑體" panose="020B0604030504040204" pitchFamily="34" charset="-120"/>
-                <a:ea typeface="微軟正黑體" panose="020B0604030504040204" pitchFamily="34" charset="-120"/>
-              </a:rPr>
-              <a:t>2 </a:t>
-            </a:r>
-            <a:r>
-              <a:rPr lang="en-US" altLang="zh-TW" sz="2000" b="1" dirty="0" err="1">
-                <a:latin typeface="微軟正黑體" panose="020B0604030504040204" pitchFamily="34" charset="-120"/>
-                <a:ea typeface="微軟正黑體" panose="020B0604030504040204" pitchFamily="34" charset="-120"/>
-              </a:rPr>
-              <a:t>mcAP</a:t>
-            </a:r>
-            <a:r>
-              <a:rPr lang="en-US" altLang="zh-TW" sz="2000" b="1" dirty="0">
-                <a:latin typeface="微軟正黑體" panose="020B0604030504040204" pitchFamily="34" charset="-120"/>
-                <a:ea typeface="微軟正黑體" panose="020B0604030504040204" pitchFamily="34" charset="-120"/>
-              </a:rPr>
-              <a:t>(Best) Model</a:t>
-            </a:r>
-            <a:r>
-              <a:rPr lang="en-US" altLang="zh-TW" sz="2000" dirty="0">
-                <a:latin typeface="微軟正黑體" panose="020B0604030504040204" pitchFamily="34" charset="-120"/>
-                <a:ea typeface="微軟正黑體" panose="020B0604030504040204" pitchFamily="34" charset="-120"/>
-              </a:rPr>
-              <a:t>: </a:t>
-            </a:r>
-            <a:r>
-              <a:rPr lang="zh-TW" altLang="en-US" sz="2000" dirty="0">
-                <a:latin typeface="微軟正黑體" panose="020B0604030504040204" pitchFamily="34" charset="-120"/>
-                <a:ea typeface="微軟正黑體" panose="020B0604030504040204" pitchFamily="34" charset="-120"/>
-              </a:rPr>
-              <a:t>僅更新 </a:t>
-            </a:r>
-            <a:r>
-              <a:rPr lang="en-US" altLang="zh-TW" sz="2000" dirty="0">
-                <a:latin typeface="微軟正黑體" panose="020B0604030504040204" pitchFamily="34" charset="-120"/>
-                <a:ea typeface="微軟正黑體" panose="020B0604030504040204" pitchFamily="34" charset="-120"/>
-              </a:rPr>
-              <a:t>2 </a:t>
-            </a:r>
-            <a:r>
-              <a:rPr lang="zh-TW" altLang="en-US" sz="2000" dirty="0">
-                <a:latin typeface="微軟正黑體" panose="020B0604030504040204" pitchFamily="34" charset="-120"/>
-                <a:ea typeface="微軟正黑體" panose="020B0604030504040204" pitchFamily="34" charset="-120"/>
-              </a:rPr>
-              <a:t>個 </a:t>
-            </a:r>
-            <a:r>
-              <a:rPr lang="en-US" altLang="zh-TW" sz="2000" dirty="0" err="1">
-                <a:latin typeface="微軟正黑體" panose="020B0604030504040204" pitchFamily="34" charset="-120"/>
-                <a:ea typeface="微軟正黑體" panose="020B0604030504040204" pitchFamily="34" charset="-120"/>
-              </a:rPr>
-              <a:t>mcAP</a:t>
-            </a:r>
-            <a:r>
-              <a:rPr lang="zh-TW" altLang="en-US" sz="2000" dirty="0">
-                <a:latin typeface="微軟正黑體" panose="020B0604030504040204" pitchFamily="34" charset="-120"/>
-                <a:ea typeface="微軟正黑體" panose="020B0604030504040204" pitchFamily="34" charset="-120"/>
-              </a:rPr>
-              <a:t>，選擇效果最佳的 </a:t>
-            </a:r>
-            <a:r>
-              <a:rPr lang="en-US" altLang="zh-TW" sz="2000" dirty="0">
-                <a:latin typeface="微軟正黑體" panose="020B0604030504040204" pitchFamily="34" charset="-120"/>
-                <a:ea typeface="微軟正黑體" panose="020B0604030504040204" pitchFamily="34" charset="-120"/>
-              </a:rPr>
-              <a:t>AP </a:t>
-            </a:r>
-            <a:r>
-              <a:rPr lang="zh-TW" altLang="en-US" sz="2000" dirty="0">
-                <a:latin typeface="微軟正黑體" panose="020B0604030504040204" pitchFamily="34" charset="-120"/>
-                <a:ea typeface="微軟正黑體" panose="020B0604030504040204" pitchFamily="34" charset="-120"/>
-              </a:rPr>
-              <a:t>更新組合 </a:t>
-            </a:r>
-            <a:r>
-              <a:rPr lang="en-US" altLang="zh-TW" sz="2000" dirty="0">
-                <a:latin typeface="微軟正黑體" panose="020B0604030504040204" pitchFamily="34" charset="-120"/>
-                <a:ea typeface="微軟正黑體" panose="020B0604030504040204" pitchFamily="34" charset="-120"/>
-              </a:rPr>
-              <a:t>( </a:t>
-            </a:r>
-            <a:r>
-              <a:rPr lang="en-US" altLang="zh-TW" sz="2000" b="1" dirty="0">
-                <a:solidFill>
-                  <a:schemeClr val="accent1">
-                    <a:lumMod val="50000"/>
-                  </a:schemeClr>
-                </a:solidFill>
-                <a:latin typeface="微軟正黑體" panose="020B0604030504040204" pitchFamily="34" charset="-120"/>
-                <a:ea typeface="微軟正黑體" panose="020B0604030504040204" pitchFamily="34" charset="-120"/>
-              </a:rPr>
-              <a:t>AP1 &amp; AP3 </a:t>
-            </a:r>
-            <a:r>
-              <a:rPr lang="en-US" altLang="zh-TW" sz="2000" dirty="0">
-                <a:latin typeface="微軟正黑體" panose="020B0604030504040204" pitchFamily="34" charset="-120"/>
-                <a:ea typeface="微軟正黑體" panose="020B0604030504040204" pitchFamily="34" charset="-120"/>
-              </a:rPr>
-              <a:t>)</a:t>
-            </a:r>
-          </a:p>
-          <a:p>
-            <a:pPr marL="800100" lvl="1" indent="-342900" eaLnBrk="0" fontAlgn="base" hangingPunct="0">
-              <a:lnSpc>
-                <a:spcPct val="150000"/>
-              </a:lnSpc>
-              <a:spcBef>
-                <a:spcPct val="0"/>
-              </a:spcBef>
-              <a:spcAft>
-                <a:spcPct val="0"/>
-              </a:spcAft>
-              <a:buFont typeface="Arial" panose="020B0604020202020204" pitchFamily="34" charset="0"/>
-              <a:buChar char="•"/>
-            </a:pPr>
-            <a:r>
-              <a:rPr lang="zh-TW" altLang="en-US" sz="2000" dirty="0">
-                <a:latin typeface="微軟正黑體" panose="020B0604030504040204" pitchFamily="34" charset="-120"/>
-                <a:ea typeface="微軟正黑體" panose="020B0604030504040204" pitchFamily="34" charset="-120"/>
-              </a:rPr>
               <a:t>特徵：                                                                                              </a:t>
-            </a:r>
-            <a:r>
-              <a:rPr lang="en-US" altLang="zh-TW" sz="1600" dirty="0">
-                <a:solidFill>
-                  <a:srgbClr val="FF0000"/>
-                </a:solidFill>
-                <a:latin typeface="微軟正黑體" panose="020B0604030504040204" pitchFamily="34" charset="-120"/>
-                <a:ea typeface="微軟正黑體" panose="020B0604030504040204" pitchFamily="34" charset="-120"/>
-              </a:rPr>
-              <a:t>+ AP1, AP3 </a:t>
-            </a:r>
-            <a:r>
-              <a:rPr lang="zh-TW" altLang="en-US" sz="1600" dirty="0">
-                <a:solidFill>
-                  <a:srgbClr val="FF0000"/>
-                </a:solidFill>
-                <a:latin typeface="微軟正黑體" panose="020B0604030504040204" pitchFamily="34" charset="-120"/>
-                <a:ea typeface="微軟正黑體" panose="020B0604030504040204" pitchFamily="34" charset="-120"/>
-              </a:rPr>
-              <a:t>的 </a:t>
-            </a:r>
-            <a:r>
-              <a:rPr lang="en-US" altLang="zh-TW" sz="1600" dirty="0" err="1">
-                <a:solidFill>
-                  <a:srgbClr val="FF0000"/>
-                </a:solidFill>
-                <a:latin typeface="微軟正黑體" panose="020B0604030504040204" pitchFamily="34" charset="-120"/>
-                <a:ea typeface="微軟正黑體" panose="020B0604030504040204" pitchFamily="34" charset="-120"/>
-              </a:rPr>
-              <a:t>StdDev</a:t>
             </a:r>
             <a:endParaRPr lang="en-US" altLang="zh-TW" sz="2000" dirty="0">
               <a:latin typeface="微軟正黑體" panose="020B0604030504040204" pitchFamily="34" charset="-120"/>
@@ -39883,21 +39570,7 @@
               </a:spcAft>
             </a:pPr>
             <a:r>
-              <a:rPr kumimoji="0" lang="en-US" altLang="zh-TW" sz="2000" b="1" i="0" u="none" strike="noStrike" cap="none" normalizeH="0" baseline="0" dirty="0">
-                <a:ln>
-                  <a:noFill/>
-                </a:ln>
-                <a:solidFill>
-                  <a:srgbClr val="FF0000"/>
-                </a:solidFill>
-                <a:effectLst/>
-                <a:latin typeface="微軟正黑體" panose="020B0604030504040204" pitchFamily="34" charset="-120"/>
-                <a:ea typeface="微軟正黑體" panose="020B0604030504040204" pitchFamily="34" charset="-120"/>
-              </a:rPr>
-              <a:t>DNN </a:t>
-            </a:r>
-            <a:r>
-              <a:rPr lang="en-US" altLang="zh-TW" sz="2000" b="1" dirty="0">
+              <a:rPr lang="en-US" altLang="zh-TW" sz="2000" b="1">
                 <a:latin typeface="微軟正黑體" panose="020B0604030504040204" pitchFamily="34" charset="-120"/>
                 <a:ea typeface="微軟正黑體" panose="020B0604030504040204" pitchFamily="34" charset="-120"/>
               </a:rPr>
@@ -40019,37 +39692,7 @@
                 <a:latin typeface="微軟正黑體" panose="020B0604030504040204" pitchFamily="34" charset="-120"/>
                 <a:ea typeface="微軟正黑體" panose="020B0604030504040204" pitchFamily="34" charset="-120"/>
               </a:rPr>
-              <a:t>特徵：                                                                                                                </a:t>
-            </a:r>
-            <a:r>
-              <a:rPr lang="en-US" altLang="zh-TW" sz="1600" dirty="0">
-                <a:solidFill>
-                  <a:srgbClr val="FF0000"/>
-                </a:solidFill>
-                <a:latin typeface="微軟正黑體" panose="020B0604030504040204" pitchFamily="34" charset="-120"/>
-                <a:ea typeface="微軟正黑體" panose="020B0604030504040204" pitchFamily="34" charset="-120"/>
-              </a:rPr>
-              <a:t>+ AP1, AP2, AP3 </a:t>
-            </a:r>
-            <a:r>
-              <a:rPr lang="zh-TW" altLang="en-US" sz="1600" dirty="0">
-                <a:solidFill>
-                  <a:srgbClr val="FF0000"/>
-                </a:solidFill>
-                <a:latin typeface="微軟正黑體" panose="020B0604030504040204" pitchFamily="34" charset="-120"/>
-                <a:ea typeface="微軟正黑體" panose="020B0604030504040204" pitchFamily="34" charset="-120"/>
-              </a:rPr>
-              <a:t>的 </a:t>
-            </a:r>
-            <a:r>
-              <a:rPr lang="en-US" altLang="zh-TW" sz="1600" dirty="0" err="1">
-                <a:solidFill>
-                  <a:srgbClr val="FF0000"/>
-                </a:solidFill>
-                <a:latin typeface="微軟正黑體" panose="020B0604030504040204" pitchFamily="34" charset="-120"/>
-                <a:ea typeface="微軟正黑體" panose="020B0604030504040204" pitchFamily="34" charset="-120"/>
-              </a:rPr>
-              <a:t>StdDev</a:t>
+              <a:t>特徵：</a:t>
             </a:r>
             <a:endParaRPr lang="en-US" altLang="zh-TW" sz="1600" dirty="0">
               <a:solidFill>
@@ -40342,514 +39985,6 @@
       </p:graphicFrame>
       <p:graphicFrame>
         <p:nvGraphicFramePr>
-          <p:cNvPr id="5" name="表格 4">
-            <a:extLst>
-              <a:ext uri="{FF2B5EF4-FFF2-40B4-BE49-F238E27FC236}">
-                <a16:creationId xmlns:a16="http://schemas.microsoft.com/office/drawing/2014/main" id="{2349614E-C3C9-DE09-9DD5-27C81E4DC650}"/>
-              </a:ext>
-            </a:extLst>
-          </p:cNvPr>
-          <p:cNvGraphicFramePr>
-            <a:graphicFrameLocks noGrp="1"/>
-          </p:cNvGraphicFramePr>
-          <p:nvPr>
-            <p:extLst>
-              <p:ext uri="{D42A27DB-BD31-4B8C-83A1-F6EECF244321}">
-                <p14:modId xmlns:p14="http://schemas.microsoft.com/office/powerpoint/2010/main" val="3126621582"/>
-              </p:ext>
-            </p:extLst>
-          </p:nvPr>
-        </p:nvGraphicFramePr>
-        <p:xfrm>
-          <a:off x="1932713" y="2829788"/>
-          <a:ext cx="8219444" cy="424491"/>
-        </p:xfrm>
-        <a:graphic>
-          <a:graphicData uri="http://schemas.openxmlformats.org/drawingml/2006/table">
-            <a:tbl>
-              <a:tblPr>
-                <a:tableStyleId>{2D5ABB26-0587-4C30-8999-92F81FD0307C}</a:tableStyleId>
-              </a:tblPr>
-              <a:tblGrid>
-                <a:gridCol w="892493">
-                  <a:extLst>
-                    <a:ext uri="{9D8B030D-6E8A-4147-A177-3AD203B41FA5}">
-                      <a16:colId xmlns:a16="http://schemas.microsoft.com/office/drawing/2014/main" val="1524305948"/>
-                    </a:ext>
-                  </a:extLst>
-                </a:gridCol>
-                <a:gridCol w="892493">
-                  <a:extLst>
-                    <a:ext uri="{9D8B030D-6E8A-4147-A177-3AD203B41FA5}">
-                      <a16:colId xmlns:a16="http://schemas.microsoft.com/office/drawing/2014/main" val="695852677"/>
-                    </a:ext>
-                  </a:extLst>
-                </a:gridCol>
-                <a:gridCol w="892493">
-                  <a:extLst>
-                    <a:ext uri="{9D8B030D-6E8A-4147-A177-3AD203B41FA5}">
-                      <a16:colId xmlns:a16="http://schemas.microsoft.com/office/drawing/2014/main" val="2759262185"/>
-                    </a:ext>
-                  </a:extLst>
-                </a:gridCol>
-                <a:gridCol w="892493">
-                  <a:extLst>
-                    <a:ext uri="{9D8B030D-6E8A-4147-A177-3AD203B41FA5}">
-                      <a16:colId xmlns:a16="http://schemas.microsoft.com/office/drawing/2014/main" val="58435716"/>
-                    </a:ext>
-                  </a:extLst>
-                </a:gridCol>
-                <a:gridCol w="1162368">
-                  <a:extLst>
-                    <a:ext uri="{9D8B030D-6E8A-4147-A177-3AD203B41FA5}">
-                      <a16:colId xmlns:a16="http://schemas.microsoft.com/office/drawing/2014/main" val="549548734"/>
-                    </a:ext>
-                  </a:extLst>
-                </a:gridCol>
-                <a:gridCol w="1162368">
-                  <a:extLst>
-                    <a:ext uri="{9D8B030D-6E8A-4147-A177-3AD203B41FA5}">
-                      <a16:colId xmlns:a16="http://schemas.microsoft.com/office/drawing/2014/main" val="2051824259"/>
-                    </a:ext>
-                  </a:extLst>
-                </a:gridCol>
-                <a:gridCol w="1162368">
-                  <a:extLst>
-                    <a:ext uri="{9D8B030D-6E8A-4147-A177-3AD203B41FA5}">
-                      <a16:colId xmlns:a16="http://schemas.microsoft.com/office/drawing/2014/main" val="755548061"/>
-                    </a:ext>
-                  </a:extLst>
-                </a:gridCol>
-                <a:gridCol w="1162368">
-                  <a:extLst>
-                    <a:ext uri="{9D8B030D-6E8A-4147-A177-3AD203B41FA5}">
-                      <a16:colId xmlns:a16="http://schemas.microsoft.com/office/drawing/2014/main" val="511942887"/>
-                    </a:ext>
-                  </a:extLst>
-                </a:gridCol>
-              </a:tblGrid>
-              <a:tr h="424491">
-                <a:tc>
-                  <a:txBody>
-                    <a:bodyPr/>
-                    <a:lstStyle/>
-                    <a:p>
-                      <a:r>
-                        <a:rPr lang="en-US" sz="1200" dirty="0"/>
-                        <a:t>AP1_Rssi</a:t>
-                      </a:r>
-                    </a:p>
-                  </a:txBody>
-                  <a:tcPr anchor="ctr">
-                    <a:lnL w="12700" cap="flat" cmpd="sng" algn="ctr">
-                      <a:solidFill>
-                        <a:schemeClr val="tx1"/>
-                      </a:solidFill>
-                      <a:prstDash val="solid"/>
-                      <a:round/>
-                      <a:headEnd type="none" w="med" len="med"/>
-                      <a:tailEnd type="none" w="med" len="med"/>
-                    </a:lnL>
-                    <a:lnR w="12700" cap="flat" cmpd="sng" algn="ctr">
-                      <a:solidFill>
-                        <a:schemeClr val="tx1"/>
-                      </a:solidFill>
-                      <a:prstDash val="solid"/>
-                      <a:round/>
-                      <a:headEnd type="none" w="med" len="med"/>
-                      <a:tailEnd type="none" w="med" len="med"/>
-                    </a:lnR>
-                    <a:lnT w="12700" cap="flat" cmpd="sng" algn="ctr">
-                      <a:solidFill>
-                        <a:schemeClr val="tx1"/>
-                      </a:solidFill>
-                      <a:prstDash val="solid"/>
-                      <a:round/>
-                      <a:headEnd type="none" w="med" len="med"/>
-                      <a:tailEnd type="none" w="med" len="med"/>
-                    </a:lnT>
-                    <a:lnB w="12700" cap="flat" cmpd="sng" algn="ctr">
-                      <a:solidFill>
-                        <a:schemeClr val="tx1"/>
-                      </a:solidFill>
-                      <a:prstDash val="solid"/>
-                      <a:round/>
-                      <a:headEnd type="none" w="med" len="med"/>
-                      <a:tailEnd type="none" w="med" len="med"/>
-                    </a:lnB>
-                  </a:tcPr>
-                </a:tc>
-                <a:tc>
-                  <a:txBody>
-                    <a:bodyPr/>
-                    <a:lstStyle/>
-                    <a:p>
-                      <a:r>
-                        <a:rPr lang="en-US" sz="1200" dirty="0"/>
-                        <a:t>AP2_Rssi</a:t>
-                      </a:r>
-                    </a:p>
-                  </a:txBody>
-                  <a:tcPr anchor="ctr">
-                    <a:lnL w="12700" cap="flat" cmpd="sng" algn="ctr">
-                      <a:solidFill>
-                        <a:schemeClr val="tx1"/>
-                      </a:solidFill>
-                      <a:prstDash val="solid"/>
-                      <a:round/>
-                      <a:headEnd type="none" w="med" len="med"/>
-                      <a:tailEnd type="none" w="med" len="med"/>
-                    </a:lnL>
-                    <a:lnR w="12700" cap="flat" cmpd="sng" algn="ctr">
-                      <a:solidFill>
-                        <a:schemeClr val="tx1"/>
-                      </a:solidFill>
-                      <a:prstDash val="solid"/>
-                      <a:round/>
-                      <a:headEnd type="none" w="med" len="med"/>
-                      <a:tailEnd type="none" w="med" len="med"/>
-                    </a:lnR>
-                    <a:lnT w="12700" cap="flat" cmpd="sng" algn="ctr">
-                      <a:solidFill>
-                        <a:schemeClr val="tx1"/>
-                      </a:solidFill>
-                      <a:prstDash val="solid"/>
-                      <a:round/>
-                      <a:headEnd type="none" w="med" len="med"/>
-                      <a:tailEnd type="none" w="med" len="med"/>
-                    </a:lnT>
-                    <a:lnB w="12700" cap="flat" cmpd="sng" algn="ctr">
-                      <a:solidFill>
-                        <a:schemeClr val="tx1"/>
-                      </a:solidFill>
-                      <a:prstDash val="solid"/>
-                      <a:round/>
-                      <a:headEnd type="none" w="med" len="med"/>
-                      <a:tailEnd type="none" w="med" len="med"/>
-                    </a:lnB>
-                  </a:tcPr>
-                </a:tc>
-                <a:tc>
-                  <a:txBody>
-                    <a:bodyPr/>
-                    <a:lstStyle/>
-                    <a:p>
-                      <a:r>
-                        <a:rPr lang="en-US" sz="1200" dirty="0"/>
-                        <a:t>AP3_Rssi</a:t>
-                      </a:r>
-                    </a:p>
-                  </a:txBody>
-                  <a:tcPr anchor="ctr">
-                    <a:lnL w="12700" cap="flat" cmpd="sng" algn="ctr">
-                      <a:solidFill>
-                        <a:schemeClr val="tx1"/>
-                      </a:solidFill>
-                      <a:prstDash val="solid"/>
-                      <a:round/>
-                      <a:headEnd type="none" w="med" len="med"/>
-                      <a:tailEnd type="none" w="med" len="med"/>
-                    </a:lnL>
-                    <a:lnR w="12700" cap="flat" cmpd="sng" algn="ctr">
-                      <a:solidFill>
-                        <a:schemeClr val="tx1"/>
-                      </a:solidFill>
-                      <a:prstDash val="solid"/>
-                      <a:round/>
-                      <a:headEnd type="none" w="med" len="med"/>
-                      <a:tailEnd type="none" w="med" len="med"/>
-                    </a:lnR>
-                    <a:lnT w="12700" cap="flat" cmpd="sng" algn="ctr">
-                      <a:solidFill>
-                        <a:schemeClr val="tx1"/>
-                      </a:solidFill>
-                      <a:prstDash val="solid"/>
-                      <a:round/>
-                      <a:headEnd type="none" w="med" len="med"/>
-                      <a:tailEnd type="none" w="med" len="med"/>
-                    </a:lnT>
-                    <a:lnB w="12700" cap="flat" cmpd="sng" algn="ctr">
-                      <a:solidFill>
-                        <a:schemeClr val="tx1"/>
-                      </a:solidFill>
-                      <a:prstDash val="solid"/>
-                      <a:round/>
-                      <a:headEnd type="none" w="med" len="med"/>
-                      <a:tailEnd type="none" w="med" len="med"/>
-                    </a:lnB>
-                    <a:lnTlToBr w="12700" cmpd="sng">
-                      <a:noFill/>
-                      <a:prstDash val="solid"/>
-                    </a:lnTlToBr>
-                    <a:lnBlToTr w="12700" cmpd="sng">
-                      <a:noFill/>
-                      <a:prstDash val="solid"/>
-                    </a:lnBlToTr>
-                  </a:tcPr>
-                </a:tc>
-                <a:tc>
-                  <a:txBody>
-                    <a:bodyPr/>
-                    <a:lstStyle/>
-                    <a:p>
-                      <a:r>
-                        <a:rPr lang="en-US" sz="1200" dirty="0"/>
-                        <a:t>AP4_Rssi</a:t>
-                      </a:r>
-                    </a:p>
-                  </a:txBody>
-                  <a:tcPr anchor="ctr">
-                    <a:lnL w="12700" cap="flat" cmpd="sng" algn="ctr">
-                      <a:solidFill>
-                        <a:schemeClr val="tx1"/>
-                      </a:solidFill>
-                      <a:prstDash val="solid"/>
-                      <a:round/>
-                      <a:headEnd type="none" w="med" len="med"/>
-                      <a:tailEnd type="none" w="med" len="med"/>
-                    </a:lnL>
-                    <a:lnR w="12700" cap="flat" cmpd="sng" algn="ctr">
-                      <a:solidFill>
-                        <a:schemeClr val="tx1"/>
-                      </a:solidFill>
-                      <a:prstDash val="solid"/>
-                      <a:round/>
-                      <a:headEnd type="none" w="med" len="med"/>
-                      <a:tailEnd type="none" w="med" len="med"/>
-                    </a:lnR>
-                    <a:lnT w="12700" cap="flat" cmpd="sng" algn="ctr">
-                      <a:solidFill>
-                        <a:schemeClr val="tx1"/>
-                      </a:solidFill>
-                      <a:prstDash val="solid"/>
-                      <a:round/>
-                      <a:headEnd type="none" w="med" len="med"/>
-                      <a:tailEnd type="none" w="med" len="med"/>
-                    </a:lnT>
-                    <a:lnB w="12700" cap="flat" cmpd="sng" algn="ctr">
-                      <a:solidFill>
-                        <a:schemeClr val="tx1"/>
-                      </a:solidFill>
-                      <a:prstDash val="solid"/>
-                      <a:round/>
-                      <a:headEnd type="none" w="med" len="med"/>
-                      <a:tailEnd type="none" w="med" len="med"/>
-                    </a:lnB>
-                  </a:tcPr>
-                </a:tc>
-                <a:tc>
-                  <a:txBody>
-                    <a:bodyPr/>
-                    <a:lstStyle/>
-                    <a:p>
-                      <a:r>
-                        <a:rPr lang="en-US" altLang="zh-TW" sz="1200" dirty="0"/>
-                        <a:t>AP1_distance</a:t>
-                      </a:r>
-                      <a:endParaRPr lang="en-US" sz="1200" dirty="0"/>
-                    </a:p>
-                  </a:txBody>
-                  <a:tcPr anchor="ctr">
-                    <a:lnL w="12700" cap="flat" cmpd="sng" algn="ctr">
-                      <a:solidFill>
-                        <a:schemeClr val="tx1"/>
-                      </a:solidFill>
-                      <a:prstDash val="solid"/>
-                      <a:round/>
-                      <a:headEnd type="none" w="med" len="med"/>
-                      <a:tailEnd type="none" w="med" len="med"/>
-                    </a:lnL>
-                    <a:lnR w="12700" cap="flat" cmpd="sng" algn="ctr">
-                      <a:solidFill>
-                        <a:schemeClr val="tx1"/>
-                      </a:solidFill>
-                      <a:prstDash val="solid"/>
-                      <a:round/>
-                      <a:headEnd type="none" w="med" len="med"/>
-                      <a:tailEnd type="none" w="med" len="med"/>
-                    </a:lnR>
-                    <a:lnT w="12700" cap="flat" cmpd="sng" algn="ctr">
-                      <a:solidFill>
-                        <a:schemeClr val="tx1"/>
-                      </a:solidFill>
-                      <a:prstDash val="solid"/>
-                      <a:round/>
-                      <a:headEnd type="none" w="med" len="med"/>
-                      <a:tailEnd type="none" w="med" len="med"/>
-                    </a:lnT>
-                    <a:lnB w="12700" cap="flat" cmpd="sng" algn="ctr">
-                      <a:solidFill>
-                        <a:schemeClr val="tx1"/>
-                      </a:solidFill>
-                      <a:prstDash val="solid"/>
-                      <a:round/>
-                      <a:headEnd type="none" w="med" len="med"/>
-                      <a:tailEnd type="none" w="med" len="med"/>
-                    </a:lnB>
-                  </a:tcPr>
-                </a:tc>
-                <a:tc>
-                  <a:txBody>
-                    <a:bodyPr/>
-                    <a:lstStyle/>
-                    <a:p>
-                      <a:r>
-                        <a:rPr lang="en-US" sz="1200" dirty="0"/>
-                        <a:t>AP2_distance</a:t>
-                      </a:r>
-                    </a:p>
-                  </a:txBody>
-                  <a:tcPr anchor="ctr">
-                    <a:lnL w="12700" cap="flat" cmpd="sng" algn="ctr">
-                      <a:solidFill>
-                        <a:schemeClr val="tx1"/>
-                      </a:solidFill>
-                      <a:prstDash val="solid"/>
-                      <a:round/>
-                      <a:headEnd type="none" w="med" len="med"/>
-                      <a:tailEnd type="none" w="med" len="med"/>
-                    </a:lnL>
-                    <a:lnR w="12700" cap="flat" cmpd="sng" algn="ctr">
-                      <a:solidFill>
-                        <a:schemeClr val="tx1"/>
-                      </a:solidFill>
-                      <a:prstDash val="solid"/>
-                      <a:round/>
-                      <a:headEnd type="none" w="med" len="med"/>
-                      <a:tailEnd type="none" w="med" len="med"/>
-                    </a:lnR>
-                    <a:lnT w="12700" cap="flat" cmpd="sng" algn="ctr">
-                      <a:solidFill>
-                        <a:schemeClr val="tx1"/>
-                      </a:solidFill>
-                      <a:prstDash val="solid"/>
-                      <a:round/>
-                      <a:headEnd type="none" w="med" len="med"/>
-                      <a:tailEnd type="none" w="med" len="med"/>
-                    </a:lnT>
-                    <a:lnB w="12700" cap="flat" cmpd="sng" algn="ctr">
-                      <a:solidFill>
-                        <a:schemeClr val="tx1"/>
-                      </a:solidFill>
-                      <a:prstDash val="solid"/>
-                      <a:round/>
-                      <a:headEnd type="none" w="med" len="med"/>
-                      <a:tailEnd type="none" w="med" len="med"/>
-                    </a:lnB>
-                  </a:tcPr>
-                </a:tc>
-                <a:tc>
-                  <a:txBody>
-                    <a:bodyPr/>
-                    <a:lstStyle/>
-                    <a:p>
-                      <a:r>
-                        <a:rPr lang="en-US" sz="1200" dirty="0"/>
-                        <a:t>AP3_distance</a:t>
-                      </a:r>
-                    </a:p>
-                  </a:txBody>
-                  <a:tcPr anchor="ctr">
-                    <a:lnL w="12700" cap="flat" cmpd="sng" algn="ctr">
-                      <a:solidFill>
-                        <a:schemeClr val="tx1"/>
-                      </a:solidFill>
-                      <a:prstDash val="solid"/>
-                      <a:round/>
-                      <a:headEnd type="none" w="med" len="med"/>
-                      <a:tailEnd type="none" w="med" len="med"/>
-                    </a:lnL>
-                    <a:lnR w="12700" cap="flat" cmpd="sng" algn="ctr">
-                      <a:solidFill>
-                        <a:schemeClr val="tx1"/>
-                      </a:solidFill>
-                      <a:prstDash val="solid"/>
-                      <a:round/>
-                      <a:headEnd type="none" w="med" len="med"/>
-                      <a:tailEnd type="none" w="med" len="med"/>
-                    </a:lnR>
-                    <a:lnT w="12700" cap="flat" cmpd="sng" algn="ctr">
-                      <a:solidFill>
-                        <a:schemeClr val="tx1"/>
-                      </a:solidFill>
-                      <a:prstDash val="solid"/>
-                      <a:round/>
-                      <a:headEnd type="none" w="med" len="med"/>
-                      <a:tailEnd type="none" w="med" len="med"/>
-                    </a:lnT>
-                    <a:lnB w="12700" cap="flat" cmpd="sng" algn="ctr">
-                      <a:solidFill>
-                        <a:schemeClr val="tx1"/>
-                      </a:solidFill>
-                      <a:prstDash val="solid"/>
-                      <a:round/>
-                      <a:headEnd type="none" w="med" len="med"/>
-                      <a:tailEnd type="none" w="med" len="med"/>
-                    </a:lnB>
-                  </a:tcPr>
-                </a:tc>
-                <a:tc>
-                  <a:txBody>
-                    <a:bodyPr/>
-                    <a:lstStyle/>
-                    <a:p>
-                      <a:r>
-                        <a:rPr lang="en-US" sz="1200" dirty="0"/>
-                        <a:t>AP4_distance</a:t>
-                      </a:r>
-                    </a:p>
-                  </a:txBody>
-                  <a:tcPr anchor="ctr">
-                    <a:lnL w="12700" cap="flat" cmpd="sng" algn="ctr">
-                      <a:solidFill>
-                        <a:schemeClr val="tx1"/>
-                      </a:solidFill>
-                      <a:prstDash val="solid"/>
-                      <a:round/>
-                      <a:headEnd type="none" w="med" len="med"/>
-                      <a:tailEnd type="none" w="med" len="med"/>
-                    </a:lnL>
-                    <a:lnR w="12700" cap="flat" cmpd="sng" algn="ctr">
-                      <a:solidFill>
-                        <a:schemeClr val="tx1"/>
-                      </a:solidFill>
-                      <a:prstDash val="solid"/>
-                      <a:round/>
-                      <a:headEnd type="none" w="med" len="med"/>
-                      <a:tailEnd type="none" w="med" len="med"/>
-                    </a:lnR>
-                    <a:lnT w="12700" cap="flat" cmpd="sng" algn="ctr">
-                      <a:solidFill>
-                        <a:schemeClr val="tx1"/>
-                      </a:solidFill>
-                      <a:prstDash val="solid"/>
-                      <a:round/>
-                      <a:headEnd type="none" w="med" len="med"/>
-                      <a:tailEnd type="none" w="med" len="med"/>
-                    </a:lnT>
-                    <a:lnB w="12700" cap="flat" cmpd="sng" algn="ctr">
-                      <a:solidFill>
-                        <a:schemeClr val="tx1"/>
-                      </a:solidFill>
-                      <a:prstDash val="solid"/>
-                      <a:round/>
-                      <a:headEnd type="none" w="med" len="med"/>
-                      <a:tailEnd type="none" w="med" len="med"/>
-                    </a:lnB>
-                  </a:tcPr>
-                </a:tc>
-                <a:extLst>
-                  <a:ext uri="{0D108BD9-81ED-4DB2-BD59-A6C34878D82A}">
-                    <a16:rowId xmlns:a16="http://schemas.microsoft.com/office/drawing/2014/main" val="4111288765"/>
-                  </a:ext>
-                </a:extLst>
-              </a:tr>
-            </a:tbl>
-          </a:graphicData>
-        </a:graphic>
-      </p:graphicFrame>
-      <p:graphicFrame>
-        <p:nvGraphicFramePr>
           <p:cNvPr id="10" name="表格 9">
             <a:extLst>
               <a:ext uri="{FF2B5EF4-FFF2-40B4-BE49-F238E27FC236}">
@@ -40863,13 +39998,13 @@
           <p:nvPr>
             <p:extLst>
               <p:ext uri="{D42A27DB-BD31-4B8C-83A1-F6EECF244321}">
-                <p14:modId xmlns:p14="http://schemas.microsoft.com/office/powerpoint/2010/main" val="2349793041"/>
+                <p14:modId xmlns:p14="http://schemas.microsoft.com/office/powerpoint/2010/main" val="3615471293"/>
               </p:ext>
             </p:extLst>
           </p:nvPr>
         </p:nvGraphicFramePr>
         <p:xfrm>
-          <a:off x="1932713" y="3771007"/>
+          <a:off x="1932713" y="2829790"/>
           <a:ext cx="4732340" cy="424491"/>
         </p:xfrm>
         <a:graphic>
@@ -41200,13 +40335,13 @@
           <p:nvPr>
             <p:extLst>
               <p:ext uri="{D42A27DB-BD31-4B8C-83A1-F6EECF244321}">
-                <p14:modId xmlns:p14="http://schemas.microsoft.com/office/powerpoint/2010/main" val="2534670177"/>
+                <p14:modId xmlns:p14="http://schemas.microsoft.com/office/powerpoint/2010/main" val="2774598561"/>
               </p:ext>
             </p:extLst>
           </p:nvPr>
         </p:nvGraphicFramePr>
         <p:xfrm>
-          <a:off x="1932713" y="4685391"/>
+          <a:off x="1932713" y="3744174"/>
           <a:ext cx="5894708" cy="424491"/>
         </p:xfrm>
         <a:graphic>
@@ -41594,13 +40729,13 @@
           <p:nvPr>
             <p:extLst>
               <p:ext uri="{D42A27DB-BD31-4B8C-83A1-F6EECF244321}">
-                <p14:modId xmlns:p14="http://schemas.microsoft.com/office/powerpoint/2010/main" val="3243711593"/>
+                <p14:modId xmlns:p14="http://schemas.microsoft.com/office/powerpoint/2010/main" val="2379358469"/>
               </p:ext>
             </p:extLst>
           </p:nvPr>
         </p:nvGraphicFramePr>
         <p:xfrm>
-          <a:off x="1932713" y="5599775"/>
+          <a:off x="1932713" y="4658558"/>
           <a:ext cx="7057076" cy="424491"/>
         </p:xfrm>
         <a:graphic>

</xml_diff>